<commit_message>
update to run in iOS 10
</commit_message>
<xml_diff>
--- a/Hunt your Car.pptx
+++ b/Hunt your Car.pptx
@@ -384,7 +384,7 @@
             <a:fld id="{54631DF8-8069-47C9-8841-009941CE3118}" type="datetimeFigureOut">
               <a:rPr lang="en-US" smtClean="0"/>
               <a:pPr/>
-              <a:t>04/10/15</a:t>
+              <a:t>09/12/15</a:t>
             </a:fld>
             <a:endParaRPr lang="en-US"/>
           </a:p>
@@ -585,7 +585,7 @@
             <a:fld id="{54631DF8-8069-47C9-8841-009941CE3118}" type="datetimeFigureOut">
               <a:rPr lang="en-US" smtClean="0"/>
               <a:pPr/>
-              <a:t>04/10/15</a:t>
+              <a:t>09/12/15</a:t>
             </a:fld>
             <a:endParaRPr lang="en-US"/>
           </a:p>
@@ -777,7 +777,7 @@
             <a:fld id="{54631DF8-8069-47C9-8841-009941CE3118}" type="datetimeFigureOut">
               <a:rPr lang="en-US" smtClean="0"/>
               <a:pPr/>
-              <a:t>04/10/15</a:t>
+              <a:t>09/12/15</a:t>
             </a:fld>
             <a:endParaRPr lang="en-US"/>
           </a:p>
@@ -971,7 +971,7 @@
             <a:fld id="{54631DF8-8069-47C9-8841-009941CE3118}" type="datetimeFigureOut">
               <a:rPr lang="en-US" smtClean="0"/>
               <a:pPr/>
-              <a:t>04/10/15</a:t>
+              <a:t>09/12/15</a:t>
             </a:fld>
             <a:endParaRPr lang="en-US"/>
           </a:p>
@@ -1194,7 +1194,7 @@
             <a:fld id="{54631DF8-8069-47C9-8841-009941CE3118}" type="datetimeFigureOut">
               <a:rPr lang="en-US" smtClean="0"/>
               <a:pPr/>
-              <a:t>04/10/15</a:t>
+              <a:t>09/12/15</a:t>
             </a:fld>
             <a:endParaRPr lang="en-US"/>
           </a:p>
@@ -1487,7 +1487,7 @@
             <a:fld id="{54631DF8-8069-47C9-8841-009941CE3118}" type="datetimeFigureOut">
               <a:rPr lang="en-US" smtClean="0"/>
               <a:pPr/>
-              <a:t>04/10/15</a:t>
+              <a:t>09/12/15</a:t>
             </a:fld>
             <a:endParaRPr lang="en-US"/>
           </a:p>
@@ -1920,7 +1920,7 @@
             <a:fld id="{54631DF8-8069-47C9-8841-009941CE3118}" type="datetimeFigureOut">
               <a:rPr lang="en-US" smtClean="0"/>
               <a:pPr/>
-              <a:t>04/10/15</a:t>
+              <a:t>09/12/15</a:t>
             </a:fld>
             <a:endParaRPr lang="en-US"/>
           </a:p>
@@ -2048,7 +2048,7 @@
             <a:fld id="{54631DF8-8069-47C9-8841-009941CE3118}" type="datetimeFigureOut">
               <a:rPr lang="en-US" smtClean="0"/>
               <a:pPr/>
-              <a:t>04/10/15</a:t>
+              <a:t>09/12/15</a:t>
             </a:fld>
             <a:endParaRPr lang="en-US"/>
           </a:p>
@@ -2185,7 +2185,7 @@
             <a:fld id="{54631DF8-8069-47C9-8841-009941CE3118}" type="datetimeFigureOut">
               <a:rPr lang="en-US" smtClean="0"/>
               <a:pPr/>
-              <a:t>04/10/15</a:t>
+              <a:t>09/12/15</a:t>
             </a:fld>
             <a:endParaRPr lang="en-US"/>
           </a:p>
@@ -2488,7 +2488,7 @@
             <a:fld id="{54631DF8-8069-47C9-8841-009941CE3118}" type="datetimeFigureOut">
               <a:rPr lang="en-US" smtClean="0"/>
               <a:pPr/>
-              <a:t>04/10/15</a:t>
+              <a:t>09/12/15</a:t>
             </a:fld>
             <a:endParaRPr lang="en-US"/>
           </a:p>
@@ -2941,7 +2941,7 @@
             <a:fld id="{54631DF8-8069-47C9-8841-009941CE3118}" type="datetimeFigureOut">
               <a:rPr lang="en-US" smtClean="0"/>
               <a:pPr/>
-              <a:t>04/10/15</a:t>
+              <a:t>09/12/15</a:t>
             </a:fld>
             <a:endParaRPr lang="en-US"/>
           </a:p>
@@ -3301,7 +3301,7 @@
             <a:fld id="{54631DF8-8069-47C9-8841-009941CE3118}" type="datetimeFigureOut">
               <a:rPr lang="en-US" smtClean="0"/>
               <a:pPr/>
-              <a:t>04/10/15</a:t>
+              <a:t>09/12/15</a:t>
             </a:fld>
             <a:endParaRPr lang="en-US"/>
           </a:p>
@@ -3905,32 +3905,8 @@
                 </a:solidFill>
                 <a:latin typeface="Franklin Gothic Medium Cond" pitchFamily="34" charset="0"/>
               </a:rPr>
-              <a:t>A </a:t>
-            </a:r>
-            <a:r>
-              <a:rPr lang="en-US" sz="3600" i="1" dirty="0" smtClean="0">
-                <a:solidFill>
-                  <a:schemeClr val="bg1"/>
-                </a:solidFill>
-                <a:latin typeface="Franklin Gothic Medium Cond" pitchFamily="34" charset="0"/>
-              </a:rPr>
-              <a:t>Cool App </a:t>
-            </a:r>
-            <a:r>
-              <a:rPr lang="en-US" sz="3600" i="1" dirty="0" smtClean="0">
-                <a:solidFill>
-                  <a:schemeClr val="bg1"/>
-                </a:solidFill>
-                <a:latin typeface="Franklin Gothic Medium Cond" pitchFamily="34" charset="0"/>
-              </a:rPr>
-              <a:t>for </a:t>
-            </a:r>
-            <a:endParaRPr lang="en-US" sz="3600" i="1" dirty="0" smtClean="0">
-              <a:solidFill>
-                <a:schemeClr val="bg1"/>
-              </a:solidFill>
-              <a:latin typeface="Franklin Gothic Medium Cond" pitchFamily="34" charset="0"/>
-            </a:endParaRPr>
+              <a:t>A Cool App for </a:t>
+            </a:r>
           </a:p>
           <a:p>
             <a:pPr algn="ctr"/>
@@ -3983,17 +3959,7 @@
                   </a:schemeClr>
                 </a:solidFill>
               </a:rPr>
-              <a:t>Team Members</a:t>
-            </a:r>
-            <a:r>
-              <a:rPr lang="en-US" sz="2400" b="1" i="1" u="sng" dirty="0" smtClean="0">
-                <a:solidFill>
-                  <a:schemeClr val="accent4">
-                    <a:lumMod val="75000"/>
-                  </a:schemeClr>
-                </a:solidFill>
-              </a:rPr>
-              <a:t>:</a:t>
+              <a:t>Team Members:</a:t>
             </a:r>
             <a:endParaRPr lang="en-US" sz="2000" b="1" u="sng" dirty="0" smtClean="0">
               <a:solidFill>
@@ -4009,23 +3975,7 @@
                   <a:schemeClr val="bg1"/>
                 </a:solidFill>
               </a:rPr>
-              <a:t>Lorenz </a:t>
-            </a:r>
-            <a:r>
-              <a:rPr lang="en-US" i="1" dirty="0" smtClean="0">
-                <a:solidFill>
-                  <a:schemeClr val="bg1"/>
-                </a:solidFill>
-              </a:rPr>
-              <a:t>Hänggi  </a:t>
-            </a:r>
-            <a:r>
-              <a:rPr lang="en-US" i="1" dirty="0" smtClean="0">
-                <a:solidFill>
-                  <a:schemeClr val="bg1"/>
-                </a:solidFill>
-              </a:rPr>
-              <a:t>(Mobile)</a:t>
+              <a:t>Lorenz Hänggi  (Mobile)</a:t>
             </a:r>
             <a:r>
               <a:rPr lang="en-US" sz="1400" b="1" i="1" dirty="0" smtClean="0">
@@ -4033,15 +3983,7 @@
                   <a:schemeClr val="bg1"/>
                 </a:solidFill>
               </a:rPr>
-              <a:t>“Team </a:t>
-            </a:r>
-            <a:r>
-              <a:rPr lang="en-US" sz="1400" b="1" i="1" dirty="0" smtClean="0">
-                <a:solidFill>
-                  <a:schemeClr val="bg1"/>
-                </a:solidFill>
-              </a:rPr>
-              <a:t>Leader” </a:t>
+              <a:t>“Team Leader” </a:t>
             </a:r>
           </a:p>
           <a:p>
@@ -4100,23 +4042,7 @@
                   <a:schemeClr val="bg1"/>
                 </a:solidFill>
               </a:rPr>
-              <a:t>Cedric </a:t>
-            </a:r>
-            <a:r>
-              <a:rPr lang="en-US" i="1" dirty="0" smtClean="0">
-                <a:solidFill>
-                  <a:schemeClr val="bg1"/>
-                </a:solidFill>
-              </a:rPr>
-              <a:t>Wider (</a:t>
-            </a:r>
-            <a:r>
-              <a:rPr lang="en-US" i="1" dirty="0" smtClean="0">
-                <a:solidFill>
-                  <a:schemeClr val="bg1"/>
-                </a:solidFill>
-              </a:rPr>
-              <a:t>Mobile)</a:t>
+              <a:t>Cedric Wider (Mobile)</a:t>
             </a:r>
           </a:p>
           <a:p>
@@ -4719,15 +4645,7 @@
                   <a:schemeClr val="bg1"/>
                 </a:solidFill>
               </a:rPr>
-              <a:t>Thank </a:t>
-            </a:r>
-            <a:r>
-              <a:rPr lang="en-US" sz="6600" i="1" dirty="0" smtClean="0">
-                <a:solidFill>
-                  <a:schemeClr val="bg1"/>
-                </a:solidFill>
-              </a:rPr>
-              <a:t>you</a:t>
+              <a:t>Thank you</a:t>
             </a:r>
             <a:endParaRPr lang="en-US" sz="6600" i="1" dirty="0">
               <a:solidFill>
@@ -4793,8 +4711,15 @@
                   </a:schemeClr>
                 </a:solidFill>
               </a:rPr>
-              <a:t>Main Goal: </a:t>
-            </a:r>
+              <a:t>Mission</a:t>
+            </a:r>
+            <a:endParaRPr lang="en-US" sz="3200" b="1" u="sng" dirty="0" smtClean="0">
+              <a:solidFill>
+                <a:schemeClr val="accent4">
+                  <a:lumMod val="75000"/>
+                </a:schemeClr>
+              </a:solidFill>
+            </a:endParaRPr>
           </a:p>
           <a:p>
             <a:endParaRPr lang="en-US" dirty="0" smtClean="0">
@@ -4815,23 +4740,7 @@
                   <a:schemeClr val="bg1"/>
                 </a:solidFill>
               </a:rPr>
-              <a:t> Develop a </a:t>
-            </a:r>
-            <a:r>
-              <a:rPr lang="en-US" sz="2800" i="1" dirty="0" smtClean="0">
-                <a:solidFill>
-                  <a:schemeClr val="bg1"/>
-                </a:solidFill>
-              </a:rPr>
-              <a:t>cool, </a:t>
-            </a:r>
-            <a:r>
-              <a:rPr lang="en-US" sz="2800" i="1" dirty="0" smtClean="0">
-                <a:solidFill>
-                  <a:schemeClr val="bg1"/>
-                </a:solidFill>
-              </a:rPr>
-              <a:t>transparent &amp; user friendly </a:t>
+              <a:t> Develop a cool, transparent &amp; user friendly </a:t>
             </a:r>
             <a:r>
               <a:rPr lang="en-US" sz="2800" i="1" dirty="0" err="1" smtClean="0">
@@ -4847,7 +4756,7 @@
                   <a:schemeClr val="bg1"/>
                 </a:solidFill>
               </a:rPr>
-              <a:t> App </a:t>
+              <a:t> App (in 40 hrs) which guides you to your dream car by hunting just the right </a:t>
             </a:r>
             <a:r>
               <a:rPr lang="en-US" sz="2800" i="1" dirty="0" smtClean="0">
@@ -4855,7 +4764,15 @@
                   <a:schemeClr val="bg1"/>
                 </a:solidFill>
               </a:rPr>
-              <a:t>(in 40 hrs) which guides you to your dream car by hunting just the right  ones based on who you are</a:t>
+              <a:t>ones </a:t>
+            </a:r>
+            <a:r>
+              <a:rPr lang="en-US" sz="2800" i="1" dirty="0" smtClean="0">
+                <a:solidFill>
+                  <a:schemeClr val="bg1"/>
+                </a:solidFill>
+              </a:rPr>
+              <a:t>based on who you are</a:t>
             </a:r>
             <a:endParaRPr lang="en-US" sz="2800" i="1" dirty="0">
               <a:solidFill>
@@ -4928,7 +4845,27 @@
                   </a:schemeClr>
                 </a:solidFill>
               </a:rPr>
-              <a:t>Major Activities that were  Implemented: </a:t>
+              <a:t>Major Activities that </a:t>
+            </a:r>
+            <a:r>
+              <a:rPr lang="en-US" sz="2800" b="1" u="sng" dirty="0" smtClean="0">
+                <a:solidFill>
+                  <a:schemeClr val="accent4">
+                    <a:lumMod val="75000"/>
+                  </a:schemeClr>
+                </a:solidFill>
+              </a:rPr>
+              <a:t>were implemented</a:t>
+            </a:r>
+            <a:r>
+              <a:rPr lang="en-US" sz="2800" b="1" u="sng" dirty="0" smtClean="0">
+                <a:solidFill>
+                  <a:schemeClr val="accent4">
+                    <a:lumMod val="75000"/>
+                  </a:schemeClr>
+                </a:solidFill>
+              </a:rPr>
+              <a:t>: </a:t>
             </a:r>
           </a:p>
         </p:txBody>
@@ -5018,15 +4955,7 @@
                   <a:schemeClr val="bg1"/>
                 </a:solidFill>
               </a:rPr>
-              <a:t>Make research </a:t>
-            </a:r>
-            <a:r>
-              <a:rPr lang="en-US" sz="2000" dirty="0" smtClean="0">
-                <a:solidFill>
-                  <a:schemeClr val="bg1"/>
-                </a:solidFill>
-              </a:rPr>
-              <a:t>of the API</a:t>
+              <a:t>Make research of the API</a:t>
             </a:r>
           </a:p>
           <a:p>
@@ -5043,31 +4972,7 @@
                   <a:schemeClr val="bg1"/>
                 </a:solidFill>
               </a:rPr>
-              <a:t>Wire framing </a:t>
-            </a:r>
-            <a:r>
-              <a:rPr lang="en-US" sz="2000" dirty="0" smtClean="0">
-                <a:solidFill>
-                  <a:schemeClr val="bg1"/>
-                </a:solidFill>
-              </a:rPr>
-              <a:t>&amp; </a:t>
-            </a:r>
-            <a:r>
-              <a:rPr lang="en-US" sz="2000" dirty="0" smtClean="0">
-                <a:solidFill>
-                  <a:schemeClr val="bg1"/>
-                </a:solidFill>
-              </a:rPr>
-              <a:t>navigation </a:t>
-            </a:r>
-            <a:r>
-              <a:rPr lang="en-US" sz="2000" dirty="0" smtClean="0">
-                <a:solidFill>
-                  <a:schemeClr val="bg1"/>
-                </a:solidFill>
-              </a:rPr>
-              <a:t>actions on high level</a:t>
+              <a:t>Wire framing &amp; navigation actions on high level</a:t>
             </a:r>
           </a:p>
           <a:p>
@@ -5084,23 +4989,7 @@
                   <a:schemeClr val="bg1"/>
                 </a:solidFill>
               </a:rPr>
-              <a:t>Determine </a:t>
-            </a:r>
-            <a:r>
-              <a:rPr lang="en-US" sz="2000" dirty="0" smtClean="0">
-                <a:solidFill>
-                  <a:schemeClr val="bg1"/>
-                </a:solidFill>
-              </a:rPr>
-              <a:t>which </a:t>
-            </a:r>
-            <a:r>
-              <a:rPr lang="en-US" sz="2000" dirty="0" smtClean="0">
-                <a:solidFill>
-                  <a:schemeClr val="bg1"/>
-                </a:solidFill>
-              </a:rPr>
-              <a:t>page is dynamic which is static </a:t>
+              <a:t>Determine which page is dynamic which is static </a:t>
             </a:r>
           </a:p>
           <a:p>
@@ -5117,15 +5006,7 @@
                   <a:schemeClr val="bg1"/>
                 </a:solidFill>
               </a:rPr>
-              <a:t>Design </a:t>
-            </a:r>
-            <a:r>
-              <a:rPr lang="en-US" sz="2000" dirty="0" smtClean="0">
-                <a:solidFill>
-                  <a:schemeClr val="bg1"/>
-                </a:solidFill>
-              </a:rPr>
-              <a:t>&amp; code for all the details of every page</a:t>
+              <a:t>Design &amp; code for all the details of every page</a:t>
             </a:r>
           </a:p>
           <a:p>
@@ -5142,29 +5023,8 @@
                   <a:schemeClr val="bg1"/>
                 </a:solidFill>
               </a:rPr>
-              <a:t>Implement </a:t>
-            </a:r>
-            <a:r>
-              <a:rPr lang="en-US" sz="2000" dirty="0" smtClean="0">
-                <a:solidFill>
-                  <a:schemeClr val="bg1"/>
-                </a:solidFill>
-              </a:rPr>
-              <a:t>a static clickable </a:t>
-            </a:r>
-            <a:r>
-              <a:rPr lang="en-US" sz="2000" dirty="0" smtClean="0">
-                <a:solidFill>
-                  <a:schemeClr val="bg1"/>
-                </a:solidFill>
-              </a:rPr>
-              <a:t>App </a:t>
-            </a:r>
-            <a:endParaRPr lang="en-US" sz="2000" dirty="0" smtClean="0">
-              <a:solidFill>
-                <a:schemeClr val="bg1"/>
-              </a:solidFill>
-            </a:endParaRPr>
+              <a:t>Implement a static clickable App </a:t>
+            </a:r>
           </a:p>
           <a:p>
             <a:pPr marL="342900" indent="-342900" algn="just">
@@ -5180,7 +5040,7 @@
                   <a:schemeClr val="bg1"/>
                 </a:solidFill>
               </a:rPr>
-              <a:t>Make every </a:t>
+              <a:t>Make every page </a:t>
             </a:r>
             <a:r>
               <a:rPr lang="en-US" sz="2000" dirty="0" smtClean="0">
@@ -5188,15 +5048,15 @@
                   <a:schemeClr val="bg1"/>
                 </a:solidFill>
               </a:rPr>
-              <a:t>page </a:t>
-            </a:r>
-            <a:r>
-              <a:rPr lang="en-US" sz="2000" dirty="0" smtClean="0">
+              <a:t>dynamic, </a:t>
+            </a:r>
+            <a:r>
+              <a:rPr lang="en-US" sz="2000" dirty="0" err="1" smtClean="0">
                 <a:solidFill>
                   <a:schemeClr val="bg1"/>
                 </a:solidFill>
               </a:rPr>
-              <a:t>dynamic</a:t>
+              <a:t>bugfixing</a:t>
             </a:r>
             <a:endParaRPr lang="en-US" sz="2000" dirty="0">
               <a:solidFill>

</xml_diff>